<commit_message>
final version of poster  + draft of presentation
</commit_message>
<xml_diff>
--- a/Poster/PosterCNN1.pptx
+++ b/Poster/PosterCNN1.pptx
@@ -401,11 +401,11 @@
         </c:dLbls>
         <c:marker val="1"/>
         <c:smooth val="0"/>
-        <c:axId val="157743360"/>
-        <c:axId val="166192256"/>
+        <c:axId val="145518976"/>
+        <c:axId val="145520896"/>
       </c:lineChart>
       <c:catAx>
-        <c:axId val="157743360"/>
+        <c:axId val="145518976"/>
         <c:scaling>
           <c:orientation val="minMax"/>
         </c:scaling>
@@ -414,7 +414,7 @@
         <c:majorTickMark val="none"/>
         <c:minorTickMark val="none"/>
         <c:tickLblPos val="nextTo"/>
-        <c:crossAx val="166192256"/>
+        <c:crossAx val="145520896"/>
         <c:crosses val="autoZero"/>
         <c:auto val="1"/>
         <c:lblAlgn val="ctr"/>
@@ -422,7 +422,7 @@
         <c:noMultiLvlLbl val="0"/>
       </c:catAx>
       <c:valAx>
-        <c:axId val="166192256"/>
+        <c:axId val="145520896"/>
         <c:scaling>
           <c:orientation val="minMax"/>
           <c:min val="59"/>
@@ -453,7 +453,7 @@
         <c:majorTickMark val="none"/>
         <c:minorTickMark val="none"/>
         <c:tickLblPos val="nextTo"/>
-        <c:crossAx val="157743360"/>
+        <c:crossAx val="145518976"/>
         <c:crosses val="autoZero"/>
         <c:crossBetween val="between"/>
       </c:valAx>
@@ -479,8 +479,8 @@
   </c:chart>
   <c:spPr>
     <a:solidFill>
-      <a:srgbClr val="D0E1EF">
-        <a:lumMod val="90000"/>
+      <a:srgbClr val="FFFFFF">
+        <a:lumMod val="95000"/>
       </a:srgbClr>
     </a:solidFill>
     <a:ln w="3175" cap="flat" cmpd="sng" algn="ctr">
@@ -695,11 +695,11 @@
           <c:showBubbleSize val="0"/>
         </c:dLbls>
         <c:gapWidth val="150"/>
-        <c:axId val="148585856"/>
-        <c:axId val="150234240"/>
+        <c:axId val="145543168"/>
+        <c:axId val="145544704"/>
       </c:barChart>
       <c:catAx>
-        <c:axId val="148585856"/>
+        <c:axId val="145543168"/>
         <c:scaling>
           <c:orientation val="minMax"/>
         </c:scaling>
@@ -718,7 +718,7 @@
             <a:endParaRPr lang="de-DE"/>
           </a:p>
         </c:txPr>
-        <c:crossAx val="150234240"/>
+        <c:crossAx val="145544704"/>
         <c:crosses val="autoZero"/>
         <c:auto val="1"/>
         <c:lblAlgn val="ctr"/>
@@ -726,7 +726,7 @@
         <c:noMultiLvlLbl val="0"/>
       </c:catAx>
       <c:valAx>
-        <c:axId val="150234240"/>
+        <c:axId val="145544704"/>
         <c:scaling>
           <c:orientation val="minMax"/>
           <c:min val="50"/>
@@ -738,7 +738,7 @@
         <c:majorTickMark val="out"/>
         <c:minorTickMark val="none"/>
         <c:tickLblPos val="nextTo"/>
-        <c:crossAx val="148585856"/>
+        <c:crossAx val="145543168"/>
         <c:crosses val="autoZero"/>
         <c:crossBetween val="between"/>
       </c:valAx>
@@ -754,8 +754,9 @@
   </c:chart>
   <c:spPr>
     <a:solidFill>
-      <a:schemeClr val="bg1">
-        <a:lumMod val="95000"/>
+      <a:schemeClr val="accent4">
+        <a:lumMod val="20000"/>
+        <a:lumOff val="80000"/>
       </a:schemeClr>
     </a:solidFill>
     <a:ln>
@@ -2205,8 +2206,8 @@
     <dgm:cxn modelId="{A3AED506-F471-4E04-A8DC-52C8D8181E44}" type="presOf" srcId="{CC61A799-F208-4923-AC40-196EC84D35A0}" destId="{1CD38CD1-B955-4AD2-BF22-930356B2D9B2}" srcOrd="0" destOrd="0" presId="urn:microsoft.com/office/officeart/2005/8/layout/chevron2"/>
     <dgm:cxn modelId="{751B960E-6CA2-4595-8683-47984CBC4556}" srcId="{CC53FDEF-EACF-4A29-868A-0E3A78604810}" destId="{CEC569C0-015E-46BD-A6F5-78A5F23A82F9}" srcOrd="0" destOrd="0" parTransId="{8FF862D3-DD48-4D89-A42A-9E47EC26DCB5}" sibTransId="{CF61592D-17A2-4A2B-9F0B-964190C89BAF}"/>
     <dgm:cxn modelId="{7EA9FFFC-D68E-4309-9045-643B0A13AF92}" type="presOf" srcId="{D3ED2D9D-61DC-4FEA-999E-91EB747ECE21}" destId="{A62383D6-8923-41FF-89BE-143E3CE6D42C}" srcOrd="0" destOrd="2" presId="urn:microsoft.com/office/officeart/2005/8/layout/chevron2"/>
+    <dgm:cxn modelId="{59DAD46A-F3B0-467E-A765-91D03F531F80}" srcId="{CC61A799-F208-4923-AC40-196EC84D35A0}" destId="{D3ED2D9D-61DC-4FEA-999E-91EB747ECE21}" srcOrd="2" destOrd="0" parTransId="{298392DB-5384-4DA9-A282-45099C298903}" sibTransId="{6E222093-3518-4D00-A83D-FC214CAEF0A4}"/>
     <dgm:cxn modelId="{70BED613-9215-41C0-9272-B4C3C6FD45D5}" type="presOf" srcId="{039494F0-4B03-4C73-AB39-8FE23CCB1898}" destId="{0C19CFB4-A4F7-43EF-B3C9-933C8FE55F26}" srcOrd="0" destOrd="2" presId="urn:microsoft.com/office/officeart/2005/8/layout/chevron2"/>
-    <dgm:cxn modelId="{59DAD46A-F3B0-467E-A765-91D03F531F80}" srcId="{CC61A799-F208-4923-AC40-196EC84D35A0}" destId="{D3ED2D9D-61DC-4FEA-999E-91EB747ECE21}" srcOrd="2" destOrd="0" parTransId="{298392DB-5384-4DA9-A282-45099C298903}" sibTransId="{6E222093-3518-4D00-A83D-FC214CAEF0A4}"/>
     <dgm:cxn modelId="{5FF57DDB-7D14-40E8-8254-D60327742119}" srcId="{6D3A7806-015F-4A4D-96B3-6DA3B5330119}" destId="{B986E098-3246-455F-B617-C9EF881AC851}" srcOrd="2" destOrd="0" parTransId="{3E25A0EC-48C4-4747-9635-BB6B0D170EEF}" sibTransId="{94FA4D92-C0E9-48DE-9B7B-4E9A350EF88A}"/>
     <dgm:cxn modelId="{B41867C4-E7AE-4207-B24C-38F28B616EC5}" type="presOf" srcId="{48D3B64D-0A06-49C2-8EBF-1DBA1544DD0A}" destId="{A62383D6-8923-41FF-89BE-143E3CE6D42C}" srcOrd="0" destOrd="0" presId="urn:microsoft.com/office/officeart/2005/8/layout/chevron2"/>
     <dgm:cxn modelId="{033C772E-3D7E-44C2-B7EB-6E0AD490FFFA}" type="presOf" srcId="{6D3A7806-015F-4A4D-96B3-6DA3B5330119}" destId="{E045DFE3-0AAA-42B3-988A-D3D7371A16D7}" srcOrd="0" destOrd="0" presId="urn:microsoft.com/office/officeart/2005/8/layout/chevron2"/>
@@ -2236,9 +2237,8 @@
   </dgm:cxnLst>
   <dgm:bg>
     <a:solidFill>
-      <a:schemeClr val="accent4">
-        <a:lumMod val="20000"/>
-        <a:lumOff val="80000"/>
+      <a:schemeClr val="accent6">
+        <a:lumMod val="90000"/>
       </a:schemeClr>
     </a:solidFill>
   </dgm:bg>
@@ -4155,7 +4155,7 @@
           <a:p>
             <a:fld id="{FF44338E-E534-4545-AC49-4E26FDF24ECE}" type="datetimeFigureOut">
               <a:rPr lang="de-CH" smtClean="0"/>
-              <a:t>10.06.2016</a:t>
+              <a:t>11.06.2016</a:t>
             </a:fld>
             <a:endParaRPr lang="de-CH"/>
           </a:p>
@@ -53361,8 +53361,9 @@
             <a:avLst/>
           </a:prstGeom>
           <a:solidFill>
-            <a:schemeClr val="bg1">
-              <a:lumMod val="95000"/>
+            <a:schemeClr val="accent4">
+              <a:lumMod val="20000"/>
+              <a:lumOff val="80000"/>
             </a:schemeClr>
           </a:solidFill>
           <a:ln>
@@ -53409,7 +53410,7 @@
             <a:avLst/>
           </a:prstGeom>
           <a:solidFill>
-            <a:schemeClr val="tx2">
+            <a:schemeClr val="accent4">
               <a:lumMod val="20000"/>
               <a:lumOff val="80000"/>
             </a:schemeClr>
@@ -53511,6 +53512,14 @@
           <a:ln>
             <a:noFill/>
           </a:ln>
+          <a:effectLst>
+            <a:glow>
+              <a:schemeClr val="accent1">
+                <a:alpha val="24000"/>
+              </a:schemeClr>
+            </a:glow>
+            <a:softEdge rad="0"/>
+          </a:effectLst>
         </p:spPr>
         <p:style>
           <a:lnRef idx="2">
@@ -53552,9 +53561,8 @@
             <a:avLst/>
           </a:prstGeom>
           <a:solidFill>
-            <a:schemeClr val="accent4">
-              <a:lumMod val="20000"/>
-              <a:lumOff val="80000"/>
+            <a:schemeClr val="accent6">
+              <a:lumMod val="90000"/>
             </a:schemeClr>
           </a:solidFill>
           <a:ln>
@@ -53861,7 +53869,7 @@
           <p:nvPr>
             <p:extLst>
               <p:ext uri="{D42A27DB-BD31-4B8C-83A1-F6EECF244321}">
-                <p14:modId xmlns:p14="http://schemas.microsoft.com/office/powerpoint/2010/main" val="106257503"/>
+                <p14:modId xmlns:p14="http://schemas.microsoft.com/office/powerpoint/2010/main" val="1316464933"/>
               </p:ext>
             </p:extLst>
           </p:nvPr>
@@ -54017,7 +54025,7 @@
             <a:avLst/>
           </a:prstGeom>
           <a:solidFill>
-            <a:schemeClr val="accent4">
+            <a:schemeClr val="tx2">
               <a:lumMod val="20000"/>
               <a:lumOff val="80000"/>
             </a:schemeClr>
@@ -54281,8 +54289,8 @@
             <a:avLst/>
           </a:prstGeom>
           <a:solidFill>
-            <a:schemeClr val="accent5">
-              <a:lumMod val="90000"/>
+            <a:schemeClr val="bg2">
+              <a:lumMod val="95000"/>
             </a:schemeClr>
           </a:solidFill>
           <a:ln>
@@ -54471,7 +54479,7 @@
           <p:nvPr>
             <p:extLst>
               <p:ext uri="{D42A27DB-BD31-4B8C-83A1-F6EECF244321}">
-                <p14:modId xmlns:p14="http://schemas.microsoft.com/office/powerpoint/2010/main" val="2268586625"/>
+                <p14:modId xmlns:p14="http://schemas.microsoft.com/office/powerpoint/2010/main" val="580839803"/>
               </p:ext>
             </p:extLst>
           </p:nvPr>
@@ -54495,7 +54503,7 @@
           <p:nvPr>
             <p:extLst>
               <p:ext uri="{D42A27DB-BD31-4B8C-83A1-F6EECF244321}">
-                <p14:modId xmlns:p14="http://schemas.microsoft.com/office/powerpoint/2010/main" val="2247985510"/>
+                <p14:modId xmlns:p14="http://schemas.microsoft.com/office/powerpoint/2010/main" val="2224151270"/>
               </p:ext>
             </p:extLst>
           </p:nvPr>
@@ -54615,7 +54623,7 @@
           <p:nvPr>
             <p:extLst>
               <p:ext uri="{D42A27DB-BD31-4B8C-83A1-F6EECF244321}">
-                <p14:modId xmlns:p14="http://schemas.microsoft.com/office/powerpoint/2010/main" val="521446960"/>
+                <p14:modId xmlns:p14="http://schemas.microsoft.com/office/powerpoint/2010/main" val="1078198001"/>
               </p:ext>
             </p:extLst>
           </p:nvPr>
@@ -55605,12 +55613,12 @@
                     <a:p>
                       <a:pPr algn="l" rtl="0" fontAlgn="ctr"/>
                       <a:r>
-                        <a:rPr lang="de-CH" sz="1200" u="sng" strike="noStrike">
+                        <a:rPr lang="de-CH" sz="1200" u="sng" strike="noStrike" dirty="0" smtClean="0">
                           <a:effectLst/>
                         </a:rPr>
-                        <a:t>66.7</a:t>
+                        <a:t>66.70</a:t>
                       </a:r>
-                      <a:endParaRPr lang="de-CH" sz="1200" b="0" i="0" u="sng" strike="noStrike">
+                      <a:endParaRPr lang="de-CH" sz="1200" b="0" i="0" u="sng" strike="noStrike" dirty="0">
                         <a:solidFill>
                           <a:srgbClr val="0B1721"/>
                         </a:solidFill>
@@ -55973,9 +55981,8 @@
             <a:avLst/>
           </a:prstGeom>
           <a:solidFill>
-            <a:schemeClr val="accent4">
-              <a:lumMod val="20000"/>
-              <a:lumOff val="80000"/>
+            <a:schemeClr val="accent6">
+              <a:lumMod val="90000"/>
             </a:schemeClr>
           </a:solidFill>
           <a:ln>
@@ -56073,11 +56080,177 @@
           <a:p>
             <a:r>
               <a:rPr lang="de-CH" sz="1200" b="1" dirty="0" smtClean="0"/>
+              <a:t>Number of Kernels:  </a:t>
+            </a:r>
+            <a:r>
+              <a:rPr lang="de-CH" sz="1200" i="1" u="sng" dirty="0" smtClean="0"/>
+              <a:t>Both</a:t>
+            </a:r>
+            <a:r>
+              <a:rPr lang="de-CH" sz="1200" dirty="0" smtClean="0"/>
+              <a:t>:  200</a:t>
+            </a:r>
+          </a:p>
+          <a:p>
+            <a:r>
+              <a:rPr lang="de-CH" sz="1200" b="1" dirty="0" smtClean="0"/>
+              <a:t>Filter Lengths: 	</a:t>
+            </a:r>
+            <a:r>
+              <a:rPr lang="de-CH" sz="1200" i="1" u="sng" dirty="0" smtClean="0"/>
+              <a:t>S1</a:t>
+            </a:r>
+            <a:r>
+              <a:rPr lang="de-CH" sz="1200" dirty="0" smtClean="0"/>
+              <a:t>: h</a:t>
+            </a:r>
+            <a:r>
+              <a:rPr lang="de-CH" sz="1200" baseline="-25000" dirty="0" smtClean="0"/>
+              <a:t>1</a:t>
+            </a:r>
+            <a:r>
+              <a:rPr lang="de-CH" sz="1200" dirty="0" smtClean="0"/>
+              <a:t>=6, h</a:t>
+            </a:r>
+            <a:r>
+              <a:rPr lang="de-CH" sz="1200" baseline="-25000" dirty="0" smtClean="0"/>
+              <a:t>2</a:t>
+            </a:r>
+            <a:r>
+              <a:rPr lang="de-CH" sz="1200" dirty="0" smtClean="0"/>
+              <a:t>=3    	</a:t>
+            </a:r>
+            <a:r>
+              <a:rPr lang="de-CH" sz="1200" i="1" u="sng" dirty="0" smtClean="0"/>
+              <a:t>S2: </a:t>
+            </a:r>
+            <a:r>
+              <a:rPr lang="de-CH" sz="1200" dirty="0"/>
+              <a:t>h</a:t>
+            </a:r>
+            <a:r>
+              <a:rPr lang="de-CH" sz="1200" baseline="-25000" dirty="0"/>
+              <a:t>1</a:t>
+            </a:r>
+            <a:r>
+              <a:rPr lang="de-CH" sz="1200" dirty="0"/>
+              <a:t>=6, </a:t>
+            </a:r>
+            <a:r>
+              <a:rPr lang="de-CH" sz="1200" dirty="0" smtClean="0"/>
+              <a:t>h</a:t>
+            </a:r>
+            <a:r>
+              <a:rPr lang="de-CH" sz="1200" baseline="-25000" dirty="0" smtClean="0"/>
+              <a:t>2</a:t>
+            </a:r>
+            <a:r>
+              <a:rPr lang="de-CH" sz="1200" dirty="0" smtClean="0"/>
+              <a:t>=4</a:t>
+            </a:r>
+          </a:p>
+          <a:p>
+            <a:r>
+              <a:rPr lang="de-CH" sz="1200" b="1" dirty="0" smtClean="0"/>
+              <a:t>Pooling Length	</a:t>
+            </a:r>
+            <a:r>
+              <a:rPr lang="de-CH" sz="1200" i="1" u="sng" dirty="0" smtClean="0"/>
+              <a:t>S1</a:t>
+            </a:r>
+            <a:r>
+              <a:rPr lang="de-CH" sz="1200" dirty="0"/>
+              <a:t>: </a:t>
+            </a:r>
+            <a:r>
+              <a:rPr lang="de-CH" sz="1200" dirty="0" smtClean="0"/>
+              <a:t>w</a:t>
+            </a:r>
+            <a:r>
+              <a:rPr lang="de-CH" sz="1200" baseline="-25000" dirty="0" smtClean="0"/>
+              <a:t>1</a:t>
+            </a:r>
+            <a:r>
+              <a:rPr lang="de-CH" sz="1200" dirty="0" smtClean="0"/>
+              <a:t>=6</a:t>
+            </a:r>
+            <a:r>
+              <a:rPr lang="de-CH" sz="1200" dirty="0"/>
+              <a:t>, </a:t>
+            </a:r>
+            <a:r>
+              <a:rPr lang="de-CH" sz="1200" dirty="0" smtClean="0"/>
+              <a:t>st</a:t>
+            </a:r>
+            <a:r>
+              <a:rPr lang="de-CH" sz="1200" baseline="-25000" dirty="0" smtClean="0"/>
+              <a:t>2</a:t>
+            </a:r>
+            <a:r>
+              <a:rPr lang="de-CH" sz="1200" dirty="0" smtClean="0"/>
+              <a:t>=2    </a:t>
+            </a:r>
+            <a:r>
+              <a:rPr lang="de-CH" sz="1200" dirty="0"/>
+              <a:t>	</a:t>
+            </a:r>
+            <a:r>
+              <a:rPr lang="de-CH" sz="1200" i="1" u="sng" dirty="0"/>
+              <a:t>S2: </a:t>
+            </a:r>
+            <a:r>
+              <a:rPr lang="de-CH" sz="1200" dirty="0" smtClean="0"/>
+              <a:t>w</a:t>
+            </a:r>
+            <a:r>
+              <a:rPr lang="de-CH" sz="1200" baseline="-25000" dirty="0" smtClean="0"/>
+              <a:t>1</a:t>
+            </a:r>
+            <a:r>
+              <a:rPr lang="de-CH" sz="1200" dirty="0" smtClean="0"/>
+              <a:t>=3, st</a:t>
+            </a:r>
+            <a:r>
+              <a:rPr lang="de-CH" sz="1200" baseline="-25000" dirty="0" smtClean="0"/>
+              <a:t>2</a:t>
+            </a:r>
+            <a:r>
+              <a:rPr lang="de-CH" sz="1200" dirty="0" smtClean="0"/>
+              <a:t>=3</a:t>
+            </a:r>
+            <a:endParaRPr lang="de-CH" sz="1200" b="1" dirty="0" smtClean="0"/>
+          </a:p>
+          <a:p>
+            <a:r>
+              <a:rPr lang="de-CH" sz="1200" b="1" dirty="0"/>
+              <a:t> </a:t>
+            </a:r>
+            <a:endParaRPr lang="de-CH" sz="1200" b="1" dirty="0" smtClean="0"/>
+          </a:p>
+          <a:p>
+            <a:r>
+              <a:rPr lang="de-CH" sz="1200" b="1" dirty="0" smtClean="0"/>
               <a:t>Optimization: </a:t>
             </a:r>
             <a:r>
               <a:rPr lang="de-CH" sz="1200" dirty="0" smtClean="0"/>
-              <a:t>AdaDelta</a:t>
+              <a:t>AdaDelta, </a:t>
+            </a:r>
+            <a:r>
+              <a:rPr lang="de-CH" sz="1200" u="sng" dirty="0" smtClean="0"/>
+              <a:t>S1</a:t>
+            </a:r>
+            <a:r>
+              <a:rPr lang="de-CH" sz="1200" dirty="0" smtClean="0"/>
+              <a:t>: no regularization </a:t>
+            </a:r>
+            <a:r>
+              <a:rPr lang="de-CH" sz="1200" u="sng" dirty="0" smtClean="0"/>
+              <a:t>S1</a:t>
+            </a:r>
+            <a:r>
+              <a:rPr lang="de-CH" sz="1200" dirty="0" smtClean="0"/>
+              <a:t>: L2 regularization</a:t>
             </a:r>
           </a:p>
           <a:p>

</xml_diff>